<commit_message>
minor changes to ep02
</commit_message>
<xml_diff>
--- a/episode2/media/slides-episode-02.pptx
+++ b/episode2/media/slides-episode-02.pptx
@@ -151,6 +151,43 @@
     </p:ext>
   </p:extLst>
 </p:presentation>
+</file>
+
+<file path=ppt/revisionInfo.xml><?xml version="1.0" encoding="utf-8"?>
+<p1510:revInfo xmlns:a="http://schemas.openxmlformats.org/drawingml/2006/main" xmlns:r="http://schemas.openxmlformats.org/officeDocument/2006/relationships" xmlns:p1510="http://schemas.microsoft.com/office/powerpoint/2015/10/main">
+  <p1510:revLst>
+    <p1510:client id="{68C78457-AA2F-44E2-B1E3-88D19C74C15C}" v="5" dt="2021-01-29T01:47:43.010"/>
+  </p1510:revLst>
+</p1510:revInfo>
+</file>
+
+<file path=ppt/changesInfos/changesInfo1.xml><?xml version="1.0" encoding="utf-8"?>
+<pc:chgInfo xmlns:a="http://schemas.openxmlformats.org/drawingml/2006/main" xmlns:r="http://schemas.openxmlformats.org/officeDocument/2006/relationships" xmlns:ac="http://schemas.microsoft.com/office/drawing/2013/main/command" xmlns:pc="http://schemas.microsoft.com/office/powerpoint/2013/main/command">
+  <pc:docChgLst>
+    <pc:chgData name="Alexandra Kappel" userId="6a3893d5f750e67b" providerId="Windows Live" clId="Web-{68C78457-AA2F-44E2-B1E3-88D19C74C15C}"/>
+    <pc:docChg chg="modSld">
+      <pc:chgData name="Alexandra Kappel" userId="6a3893d5f750e67b" providerId="Windows Live" clId="Web-{68C78457-AA2F-44E2-B1E3-88D19C74C15C}" dt="2021-01-29T01:47:42.807" v="1" actId="20577"/>
+      <pc:docMkLst>
+        <pc:docMk/>
+      </pc:docMkLst>
+      <pc:sldChg chg="modSp">
+        <pc:chgData name="Alexandra Kappel" userId="6a3893d5f750e67b" providerId="Windows Live" clId="Web-{68C78457-AA2F-44E2-B1E3-88D19C74C15C}" dt="2021-01-29T01:47:42.807" v="1" actId="20577"/>
+        <pc:sldMkLst>
+          <pc:docMk/>
+          <pc:sldMk cId="3715486455" sldId="278"/>
+        </pc:sldMkLst>
+        <pc:spChg chg="mod">
+          <ac:chgData name="Alexandra Kappel" userId="6a3893d5f750e67b" providerId="Windows Live" clId="Web-{68C78457-AA2F-44E2-B1E3-88D19C74C15C}" dt="2021-01-29T01:47:42.807" v="1" actId="20577"/>
+          <ac:spMkLst>
+            <pc:docMk/>
+            <pc:sldMk cId="3715486455" sldId="278"/>
+            <ac:spMk id="3" creationId="{3DA0104E-B78E-4F54-84D5-CD6975655220}"/>
+          </ac:spMkLst>
+        </pc:spChg>
+      </pc:sldChg>
+    </pc:docChg>
+  </pc:docChgLst>
+</pc:chgInfo>
 </file>
 
 <file path=ppt/charts/chart1.xml><?xml version="1.0" encoding="utf-8"?>
@@ -329,10 +366,10 @@
                 <c:formatCode>General</c:formatCode>
                 <c:ptCount val="2"/>
                 <c:pt idx="0">
-                  <c:v>19</c:v>
+                  <c:v>24</c:v>
                 </c:pt>
                 <c:pt idx="1">
-                  <c:v>1</c:v>
+                  <c:v>9</c:v>
                 </c:pt>
               </c:numCache>
             </c:numRef>
@@ -7496,7 +7533,7 @@
           <a:p>
             <a:r>
               <a:rPr lang="en-US" sz="3200" dirty="0"/>
-              <a:t>Coach Coop</a:t>
+              <a:t>Couch Coop</a:t>
             </a:r>
           </a:p>
           <a:p>
@@ -9401,7 +9438,9 @@
         </p:nvSpPr>
         <p:spPr/>
         <p:txBody>
-          <a:bodyPr/>
+          <a:bodyPr vert="horz" lIns="91440" tIns="45720" rIns="91440" bIns="45720" rtlCol="0" anchor="t">
+            <a:normAutofit/>
+          </a:bodyPr>
           <a:lstStyle/>
           <a:p>
             <a:r>
@@ -9412,29 +9451,13 @@
           <a:p>
             <a:r>
               <a:rPr lang="en-US" dirty="0"/>
-              <a:t>How to create a </a:t>
-            </a:r>
-            <a:r>
-              <a:rPr lang="en-US" dirty="0" err="1"/>
-              <a:t>Blazor</a:t>
-            </a:r>
+              <a:t>How to create a Blazor application</a:t>
+            </a:r>
+          </a:p>
+          <a:p>
             <a:r>
               <a:rPr lang="en-US" dirty="0"/>
-              <a:t> application</a:t>
-            </a:r>
-          </a:p>
-          <a:p>
-            <a:r>
-              <a:rPr lang="en-US" dirty="0"/>
-              <a:t>Inspecting the skeleton of an </a:t>
-            </a:r>
-            <a:r>
-              <a:rPr lang="en-US" dirty="0" err="1"/>
-              <a:t>Blazor</a:t>
-            </a:r>
-            <a:r>
-              <a:rPr lang="en-US" dirty="0"/>
-              <a:t> application</a:t>
+              <a:t>Inspecting the skeleton of a Blazor application</a:t>
             </a:r>
           </a:p>
           <a:p>
@@ -9752,14 +9775,14 @@
             <a:pPr lvl="1"/>
             <a:r>
               <a:rPr lang="en-US" sz="2800" dirty="0"/>
-              <a:t>Twitch: 19</a:t>
+              <a:t>Twitch: 24</a:t>
             </a:r>
           </a:p>
           <a:p>
             <a:pPr lvl="1"/>
             <a:r>
               <a:rPr lang="en-US" sz="2800" dirty="0"/>
-              <a:t>YouTube: 1</a:t>
+              <a:t>YouTube: 9</a:t>
             </a:r>
           </a:p>
           <a:p>
@@ -9795,7 +9818,7 @@
             <p:ph sz="half" idx="2"/>
             <p:extLst>
               <p:ext uri="{D42A27DB-BD31-4B8C-83A1-F6EECF244321}">
-                <p14:modId xmlns:p14="http://schemas.microsoft.com/office/powerpoint/2010/main" val="2735458553"/>
+                <p14:modId xmlns:p14="http://schemas.microsoft.com/office/powerpoint/2010/main" val="1476776524"/>
               </p:ext>
             </p:extLst>
           </p:nvPr>

</xml_diff>